<commit_message>
reorganized, deleted irrelevant files, finetuned
</commit_message>
<xml_diff>
--- a/2024_09_09_Lake Murray Bioassays - Figures and Stats Summaries.pptx
+++ b/2024_09_09_Lake Murray Bioassays - Figures and Stats Summaries.pptx
@@ -124,16 +124,32 @@
 </p:presentation>
 </file>
 
-<file path=ppt/revisionInfo.xml><?xml version="1.0" encoding="utf-8"?>
-<p1510:revInfo xmlns:a="http://schemas.openxmlformats.org/drawingml/2006/main" xmlns:r="http://schemas.openxmlformats.org/officeDocument/2006/relationships" xmlns:p1510="http://schemas.microsoft.com/office/powerpoint/2015/10/main">
-  <p1510:revLst>
-    <p1510:client id="{C4F4DA30-0D05-414F-B0B1-B4EECF11B26E}" v="6" dt="2024-09-10T15:59:04.536"/>
-  </p1510:revLst>
-</p1510:revInfo>
-</file>
-
 <file path=ppt/changesInfos/changesInfo1.xml><?xml version="1.0" encoding="utf-8"?>
 <pc:chgInfo xmlns:a="http://schemas.openxmlformats.org/drawingml/2006/main" xmlns:r="http://schemas.openxmlformats.org/officeDocument/2006/relationships" xmlns:ac="http://schemas.microsoft.com/office/drawing/2013/main/command" xmlns:pc="http://schemas.microsoft.com/office/powerpoint/2013/main/command">
+  <pc:docChgLst>
+    <pc:chgData name="Cat Schlenker" userId="4795f5e3347afba5" providerId="LiveId" clId="{E345D057-7234-4AD2-B7D0-9CCEDFA27680}"/>
+    <pc:docChg chg="undo custSel modSld">
+      <pc:chgData name="Cat Schlenker" userId="4795f5e3347afba5" providerId="LiveId" clId="{E345D057-7234-4AD2-B7D0-9CCEDFA27680}" dt="2025-01-07T16:24:17.204" v="59" actId="20577"/>
+      <pc:docMkLst>
+        <pc:docMk/>
+      </pc:docMkLst>
+      <pc:sldChg chg="modSp mod">
+        <pc:chgData name="Cat Schlenker" userId="4795f5e3347afba5" providerId="LiveId" clId="{E345D057-7234-4AD2-B7D0-9CCEDFA27680}" dt="2025-01-07T16:24:17.204" v="59" actId="20577"/>
+        <pc:sldMkLst>
+          <pc:docMk/>
+          <pc:sldMk cId="721553390" sldId="264"/>
+        </pc:sldMkLst>
+        <pc:spChg chg="mod">
+          <ac:chgData name="Cat Schlenker" userId="4795f5e3347afba5" providerId="LiveId" clId="{E345D057-7234-4AD2-B7D0-9CCEDFA27680}" dt="2025-01-07T16:24:17.204" v="59" actId="20577"/>
+          <ac:spMkLst>
+            <pc:docMk/>
+            <pc:sldMk cId="721553390" sldId="264"/>
+            <ac:spMk id="6" creationId="{9589EB15-DD03-A7A6-35FA-02CDC2E4789A}"/>
+          </ac:spMkLst>
+        </pc:spChg>
+      </pc:sldChg>
+    </pc:docChg>
+  </pc:docChgLst>
   <pc:docChgLst>
     <pc:chgData name="Cat Schlenker" userId="4795f5e3347afba5" providerId="LiveId" clId="{C4F4DA30-0D05-414F-B0B1-B4EECF11B26E}"/>
     <pc:docChg chg="undo custSel modSld">
@@ -147,70 +163,6 @@
           <pc:docMk/>
           <pc:sldMk cId="567054300" sldId="266"/>
         </pc:sldMkLst>
-        <pc:spChg chg="mod">
-          <ac:chgData name="Cat Schlenker" userId="4795f5e3347afba5" providerId="LiveId" clId="{C4F4DA30-0D05-414F-B0B1-B4EECF11B26E}" dt="2024-09-10T15:19:23.167" v="14" actId="20577"/>
-          <ac:spMkLst>
-            <pc:docMk/>
-            <pc:sldMk cId="567054300" sldId="266"/>
-            <ac:spMk id="2" creationId="{64396403-3A73-2485-715D-B8547AB15B7C}"/>
-          </ac:spMkLst>
-        </pc:spChg>
-        <pc:spChg chg="add del mod ord">
-          <ac:chgData name="Cat Schlenker" userId="4795f5e3347afba5" providerId="LiveId" clId="{C4F4DA30-0D05-414F-B0B1-B4EECF11B26E}" dt="2024-09-10T15:58:01.464" v="44"/>
-          <ac:spMkLst>
-            <pc:docMk/>
-            <pc:sldMk cId="567054300" sldId="266"/>
-            <ac:spMk id="4" creationId="{31F67224-822E-2FE0-65F2-E0333A1E07DE}"/>
-          </ac:spMkLst>
-        </pc:spChg>
-        <pc:spChg chg="del mod">
-          <ac:chgData name="Cat Schlenker" userId="4795f5e3347afba5" providerId="LiveId" clId="{C4F4DA30-0D05-414F-B0B1-B4EECF11B26E}" dt="2024-09-10T15:19:38.714" v="18" actId="478"/>
-          <ac:spMkLst>
-            <pc:docMk/>
-            <pc:sldMk cId="567054300" sldId="266"/>
-            <ac:spMk id="6" creationId="{6A2E4FD5-9154-7C20-74E3-661F98A126A7}"/>
-          </ac:spMkLst>
-        </pc:spChg>
-        <pc:graphicFrameChg chg="add mod">
-          <ac:chgData name="Cat Schlenker" userId="4795f5e3347afba5" providerId="LiveId" clId="{C4F4DA30-0D05-414F-B0B1-B4EECF11B26E}" dt="2024-09-10T15:58:01.464" v="44"/>
-          <ac:graphicFrameMkLst>
-            <pc:docMk/>
-            <pc:sldMk cId="567054300" sldId="266"/>
-            <ac:graphicFrameMk id="7" creationId="{722D13C5-9293-F964-862E-EA6ECC33A436}"/>
-          </ac:graphicFrameMkLst>
-        </pc:graphicFrameChg>
-        <pc:picChg chg="del">
-          <ac:chgData name="Cat Schlenker" userId="4795f5e3347afba5" providerId="LiveId" clId="{C4F4DA30-0D05-414F-B0B1-B4EECF11B26E}" dt="2024-09-10T15:19:25.121" v="15" actId="478"/>
-          <ac:picMkLst>
-            <pc:docMk/>
-            <pc:sldMk cId="567054300" sldId="266"/>
-            <ac:picMk id="5" creationId="{CFCA149D-F272-68D1-10D3-CA1ADA9FBEE8}"/>
-          </ac:picMkLst>
-        </pc:picChg>
-        <pc:picChg chg="add mod modCrop">
-          <ac:chgData name="Cat Schlenker" userId="4795f5e3347afba5" providerId="LiveId" clId="{C4F4DA30-0D05-414F-B0B1-B4EECF11B26E}" dt="2024-09-10T15:58:47.957" v="53" actId="1076"/>
-          <ac:picMkLst>
-            <pc:docMk/>
-            <pc:sldMk cId="567054300" sldId="266"/>
-            <ac:picMk id="9" creationId="{99543275-A658-BEBD-2CE3-94DC6799C5AC}"/>
-          </ac:picMkLst>
-        </pc:picChg>
-        <pc:picChg chg="add mod modCrop">
-          <ac:chgData name="Cat Schlenker" userId="4795f5e3347afba5" providerId="LiveId" clId="{C4F4DA30-0D05-414F-B0B1-B4EECF11B26E}" dt="2024-09-10T15:58:53.281" v="55" actId="14100"/>
-          <ac:picMkLst>
-            <pc:docMk/>
-            <pc:sldMk cId="567054300" sldId="266"/>
-            <ac:picMk id="11" creationId="{AC1EEDDE-DFB3-EEE1-7C1C-12364CFA8365}"/>
-          </ac:picMkLst>
-        </pc:picChg>
-        <pc:picChg chg="add mod modCrop">
-          <ac:chgData name="Cat Schlenker" userId="4795f5e3347afba5" providerId="LiveId" clId="{C4F4DA30-0D05-414F-B0B1-B4EECF11B26E}" dt="2024-09-10T15:59:27.436" v="61" actId="1076"/>
-          <ac:picMkLst>
-            <pc:docMk/>
-            <pc:sldMk cId="567054300" sldId="266"/>
-            <ac:picMk id="13" creationId="{D486C4DA-6169-9DFA-3DC9-CBBC5A63FE80}"/>
-          </ac:picMkLst>
-        </pc:picChg>
       </pc:sldChg>
     </pc:docChg>
   </pc:docChgLst>
@@ -299,7 +251,7 @@
           <a:p>
             <a:fld id="{DF4B4233-EA93-41AF-BD1E-651B53496951}" type="datetimeFigureOut">
               <a:rPr lang="en-US" smtClean="0"/>
-              <a:t>9/10/2024</a:t>
+              <a:t>1/7/2025</a:t>
             </a:fld>
             <a:endParaRPr lang="en-US"/>
           </a:p>
@@ -806,7 +758,7 @@
           <a:p>
             <a:fld id="{F63DFC3A-2FD0-4096-9F32-4F56E9B05499}" type="datetimeFigureOut">
               <a:rPr lang="en-US" smtClean="0"/>
-              <a:t>9/10/2024</a:t>
+              <a:t>1/7/2025</a:t>
             </a:fld>
             <a:endParaRPr lang="en-US"/>
           </a:p>
@@ -1004,7 +956,7 @@
           <a:p>
             <a:fld id="{F63DFC3A-2FD0-4096-9F32-4F56E9B05499}" type="datetimeFigureOut">
               <a:rPr lang="en-US" smtClean="0"/>
-              <a:t>9/10/2024</a:t>
+              <a:t>1/7/2025</a:t>
             </a:fld>
             <a:endParaRPr lang="en-US"/>
           </a:p>
@@ -1212,7 +1164,7 @@
           <a:p>
             <a:fld id="{F63DFC3A-2FD0-4096-9F32-4F56E9B05499}" type="datetimeFigureOut">
               <a:rPr lang="en-US" smtClean="0"/>
-              <a:t>9/10/2024</a:t>
+              <a:t>1/7/2025</a:t>
             </a:fld>
             <a:endParaRPr lang="en-US"/>
           </a:p>
@@ -1410,7 +1362,7 @@
           <a:p>
             <a:fld id="{F63DFC3A-2FD0-4096-9F32-4F56E9B05499}" type="datetimeFigureOut">
               <a:rPr lang="en-US" smtClean="0"/>
-              <a:t>9/10/2024</a:t>
+              <a:t>1/7/2025</a:t>
             </a:fld>
             <a:endParaRPr lang="en-US"/>
           </a:p>
@@ -1685,7 +1637,7 @@
           <a:p>
             <a:fld id="{F63DFC3A-2FD0-4096-9F32-4F56E9B05499}" type="datetimeFigureOut">
               <a:rPr lang="en-US" smtClean="0"/>
-              <a:t>9/10/2024</a:t>
+              <a:t>1/7/2025</a:t>
             </a:fld>
             <a:endParaRPr lang="en-US"/>
           </a:p>
@@ -1950,7 +1902,7 @@
           <a:p>
             <a:fld id="{F63DFC3A-2FD0-4096-9F32-4F56E9B05499}" type="datetimeFigureOut">
               <a:rPr lang="en-US" smtClean="0"/>
-              <a:t>9/10/2024</a:t>
+              <a:t>1/7/2025</a:t>
             </a:fld>
             <a:endParaRPr lang="en-US"/>
           </a:p>
@@ -2362,7 +2314,7 @@
           <a:p>
             <a:fld id="{F63DFC3A-2FD0-4096-9F32-4F56E9B05499}" type="datetimeFigureOut">
               <a:rPr lang="en-US" smtClean="0"/>
-              <a:t>9/10/2024</a:t>
+              <a:t>1/7/2025</a:t>
             </a:fld>
             <a:endParaRPr lang="en-US"/>
           </a:p>
@@ -2503,7 +2455,7 @@
           <a:p>
             <a:fld id="{F63DFC3A-2FD0-4096-9F32-4F56E9B05499}" type="datetimeFigureOut">
               <a:rPr lang="en-US" smtClean="0"/>
-              <a:t>9/10/2024</a:t>
+              <a:t>1/7/2025</a:t>
             </a:fld>
             <a:endParaRPr lang="en-US"/>
           </a:p>
@@ -2616,7 +2568,7 @@
           <a:p>
             <a:fld id="{F63DFC3A-2FD0-4096-9F32-4F56E9B05499}" type="datetimeFigureOut">
               <a:rPr lang="en-US" smtClean="0"/>
-              <a:t>9/10/2024</a:t>
+              <a:t>1/7/2025</a:t>
             </a:fld>
             <a:endParaRPr lang="en-US"/>
           </a:p>
@@ -2927,7 +2879,7 @@
           <a:p>
             <a:fld id="{F63DFC3A-2FD0-4096-9F32-4F56E9B05499}" type="datetimeFigureOut">
               <a:rPr lang="en-US" smtClean="0"/>
-              <a:t>9/10/2024</a:t>
+              <a:t>1/7/2025</a:t>
             </a:fld>
             <a:endParaRPr lang="en-US"/>
           </a:p>
@@ -3215,7 +3167,7 @@
           <a:p>
             <a:fld id="{F63DFC3A-2FD0-4096-9F32-4F56E9B05499}" type="datetimeFigureOut">
               <a:rPr lang="en-US" smtClean="0"/>
-              <a:t>9/10/2024</a:t>
+              <a:t>1/7/2025</a:t>
             </a:fld>
             <a:endParaRPr lang="en-US"/>
           </a:p>
@@ -3456,7 +3408,7 @@
           <a:p>
             <a:fld id="{F63DFC3A-2FD0-4096-9F32-4F56E9B05499}" type="datetimeFigureOut">
               <a:rPr lang="en-US" smtClean="0"/>
-              <a:t>9/10/2024</a:t>
+              <a:t>1/7/2025</a:t>
             </a:fld>
             <a:endParaRPr lang="en-US"/>
           </a:p>
@@ -10550,7 +10502,7 @@
         <p:spPr>
           <a:xfrm>
             <a:off x="8830686" y="2242557"/>
-            <a:ext cx="2645923" cy="3970318"/>
+            <a:ext cx="2645923" cy="2031325"/>
           </a:xfrm>
           <a:prstGeom prst="rect">
             <a:avLst/>
@@ -10575,7 +10527,7 @@
             </a:pPr>
             <a:r>
               <a:rPr lang="en-US" dirty="0"/>
-              <a:t>10% Max &gt; T0</a:t>
+              <a:t>25%, 50%, 75%, 100%, 125% Max &lt; Methanol Control</a:t>
             </a:r>
           </a:p>
           <a:p>
@@ -10585,7 +10537,7 @@
             </a:pPr>
             <a:r>
               <a:rPr lang="en-US" dirty="0"/>
-              <a:t>100% Max &lt; Methanol Control</a:t>
+              <a:t>10%, 75% Max &gt; T0</a:t>
             </a:r>
           </a:p>
           <a:p>
@@ -10595,77 +10547,7 @@
             </a:pPr>
             <a:r>
               <a:rPr lang="en-US" dirty="0"/>
-              <a:t>125% Max &lt; Methanol </a:t>
-            </a:r>
-          </a:p>
-          <a:p>
-            <a:pPr marL="285750" indent="-285750">
-              <a:buFont typeface="Arial" panose="020B0604020202020204" pitchFamily="34" charset="0"/>
-              <a:buChar char="•"/>
-            </a:pPr>
-            <a:r>
-              <a:rPr lang="en-US" dirty="0"/>
-              <a:t>25% Max &lt; Methanol </a:t>
-            </a:r>
-          </a:p>
-          <a:p>
-            <a:pPr marL="285750" indent="-285750">
-              <a:buFont typeface="Arial" panose="020B0604020202020204" pitchFamily="34" charset="0"/>
-              <a:buChar char="•"/>
-            </a:pPr>
-            <a:r>
-              <a:rPr lang="en-US" dirty="0"/>
-              <a:t>50% Max &lt; Methanol </a:t>
-            </a:r>
-          </a:p>
-          <a:p>
-            <a:pPr marL="285750" indent="-285750">
-              <a:buFont typeface="Arial" panose="020B0604020202020204" pitchFamily="34" charset="0"/>
-              <a:buChar char="•"/>
-            </a:pPr>
-            <a:r>
-              <a:rPr lang="en-US" dirty="0"/>
-              <a:t>75% Max &lt; Methanol </a:t>
-            </a:r>
-          </a:p>
-          <a:p>
-            <a:pPr marL="285750" indent="-285750">
-              <a:buFont typeface="Arial" panose="020B0604020202020204" pitchFamily="34" charset="0"/>
-              <a:buChar char="•"/>
-            </a:pPr>
-            <a:r>
-              <a:rPr lang="en-US" dirty="0"/>
-              <a:t>75% Max &gt; T0</a:t>
-            </a:r>
-          </a:p>
-          <a:p>
-            <a:pPr marL="285750" indent="-285750">
-              <a:buFont typeface="Arial" panose="020B0604020202020204" pitchFamily="34" charset="0"/>
-              <a:buChar char="•"/>
-            </a:pPr>
-            <a:r>
-              <a:rPr lang="en-US" dirty="0"/>
-              <a:t>Methanol Control &gt; Control</a:t>
-            </a:r>
-          </a:p>
-          <a:p>
-            <a:pPr marL="285750" indent="-285750">
-              <a:buFont typeface="Arial" panose="020B0604020202020204" pitchFamily="34" charset="0"/>
-              <a:buChar char="•"/>
-            </a:pPr>
-            <a:r>
-              <a:rPr lang="en-US" dirty="0"/>
-              <a:t>Methanol Control &gt; Time Zero</a:t>
-            </a:r>
-          </a:p>
-          <a:p>
-            <a:pPr marL="285750" indent="-285750">
-              <a:buFont typeface="Arial" panose="020B0604020202020204" pitchFamily="34" charset="0"/>
-              <a:buChar char="•"/>
-            </a:pPr>
-            <a:r>
-              <a:rPr lang="en-US" dirty="0"/>
-              <a:t>Control &gt; Time Zero</a:t>
+              <a:t>Methanol Control &gt; Control, Time Zero</a:t>
             </a:r>
           </a:p>
         </p:txBody>

</xml_diff>